<commit_message>
get input on IHCS use cases
</commit_message>
<xml_diff>
--- a/ArchitectureOverviewStatus.pptx
+++ b/ArchitectureOverviewStatus.pptx
@@ -3447,8 +3447,8 @@
           </p:nvSpPr>
           <p:spPr>
             <a:xfrm>
-              <a:off x="665748" y="848499"/>
-              <a:ext cx="1038619" cy="461665"/>
+              <a:off x="510834" y="848499"/>
+              <a:ext cx="1354187" cy="461665"/>
             </a:xfrm>
             <a:prstGeom prst="rect">
               <a:avLst/>
@@ -3621,7 +3621,7 @@
         </p:nvCxnSpPr>
         <p:spPr>
           <a:xfrm flipH="1">
-            <a:off x="1874111" y="2086784"/>
+            <a:off x="1874111" y="1856045"/>
             <a:ext cx="866220" cy="0"/>
           </a:xfrm>
           <a:prstGeom prst="line">
@@ -3661,15 +3661,15 @@
           <p:nvPr/>
         </p:nvCxnSpPr>
         <p:spPr>
-          <a:xfrm flipH="1">
-            <a:off x="7420860" y="1980890"/>
-            <a:ext cx="365760" cy="0"/>
+          <a:xfrm>
+            <a:off x="7402426" y="1989424"/>
+            <a:ext cx="433043" cy="0"/>
           </a:xfrm>
           <a:prstGeom prst="line">
             <a:avLst/>
           </a:prstGeom>
           <a:ln>
-            <a:headEnd type="stealth" w="lg" len="lg"/>
+            <a:headEnd type="none" w="lg" len="lg"/>
             <a:tailEnd type="stealth" w="lg" len="lg"/>
           </a:ln>
         </p:spPr>
@@ -3908,7 +3908,7 @@
             </a:solidFill>
             <a:ln w="38100">
               <a:solidFill>
-                <a:srgbClr val="00B050"/>
+                <a:srgbClr val="FFC000"/>
               </a:solidFill>
             </a:ln>
           </p:spPr>
@@ -4130,10 +4130,10 @@
         </p:nvGrpSpPr>
         <p:grpSpPr>
           <a:xfrm>
-            <a:off x="4098056" y="5053770"/>
-            <a:ext cx="1371600" cy="445150"/>
+            <a:off x="68022" y="4983943"/>
+            <a:ext cx="5072387" cy="1680552"/>
             <a:chOff x="6005397" y="3057603"/>
-            <a:chExt cx="1371600" cy="445150"/>
+            <a:chExt cx="1371600" cy="1448086"/>
           </a:xfrm>
         </p:grpSpPr>
         <p:sp>
@@ -4151,7 +4151,7 @@
           <p:spPr>
             <a:xfrm>
               <a:off x="6005397" y="3057603"/>
-              <a:ext cx="1371600" cy="445150"/>
+              <a:ext cx="1371600" cy="1448086"/>
             </a:xfrm>
             <a:prstGeom prst="rect">
               <a:avLst/>
@@ -4201,8 +4201,8 @@
           </p:nvSpPr>
           <p:spPr>
             <a:xfrm>
-              <a:off x="6415320" y="3152001"/>
-              <a:ext cx="551754" cy="276999"/>
+              <a:off x="6006402" y="4263617"/>
+              <a:ext cx="1370595" cy="238683"/>
             </a:xfrm>
             <a:prstGeom prst="rect">
               <a:avLst/>
@@ -4210,11 +4210,12 @@
             <a:noFill/>
           </p:spPr>
           <p:txBody>
-            <a:bodyPr wrap="none" rtlCol="0">
+            <a:bodyPr wrap="square" rtlCol="0">
               <a:spAutoFit/>
             </a:bodyPr>
             <a:lstStyle/>
             <a:p>
+              <a:pPr algn="ctr"/>
               <a:r>
                 <a:rPr lang="en-US" sz="1200" dirty="0">
                   <a:solidFill>
@@ -4225,7 +4226,7 @@
                   <a:latin typeface="Arial" panose="020B0604020202020204" pitchFamily="34" charset="0"/>
                   <a:cs typeface="Arial" panose="020B0604020202020204" pitchFamily="34" charset="0"/>
                 </a:rPr>
-                <a:t>IHCS</a:t>
+                <a:t>IHCS use cases</a:t>
               </a:r>
             </a:p>
           </p:txBody>
@@ -4326,8 +4327,8 @@
         </p:nvSpPr>
         <p:spPr>
           <a:xfrm>
-            <a:off x="2906822" y="1330959"/>
-            <a:ext cx="1038619" cy="276999"/>
+            <a:off x="2740331" y="1330959"/>
+            <a:ext cx="1357726" cy="276999"/>
           </a:xfrm>
           <a:prstGeom prst="rect">
             <a:avLst/>
@@ -4335,7 +4336,7 @@
           <a:noFill/>
         </p:spPr>
         <p:txBody>
-          <a:bodyPr wrap="none" rtlCol="0">
+          <a:bodyPr wrap="square" rtlCol="0">
             <a:spAutoFit/>
           </a:bodyPr>
           <a:lstStyle/>
@@ -4351,7 +4352,7 @@
                 <a:latin typeface="Arial" panose="020B0604020202020204" pitchFamily="34" charset="0"/>
                 <a:cs typeface="Arial" panose="020B0604020202020204" pitchFamily="34" charset="0"/>
               </a:rPr>
-              <a:t>Connect API</a:t>
+              <a:t>Connect APIs</a:t>
             </a:r>
           </a:p>
         </p:txBody>
@@ -4370,7 +4371,7 @@
         </p:nvSpPr>
         <p:spPr>
           <a:xfrm>
-            <a:off x="3510609" y="1706304"/>
+            <a:off x="3534044" y="1629371"/>
             <a:ext cx="1121397" cy="276999"/>
           </a:xfrm>
           <a:prstGeom prst="rect">
@@ -4416,7 +4417,7 @@
         </p:nvSpPr>
         <p:spPr>
           <a:xfrm>
-            <a:off x="3510609" y="2060617"/>
+            <a:off x="3510609" y="2392222"/>
             <a:ext cx="1156086" cy="276999"/>
           </a:xfrm>
           <a:prstGeom prst="rect">
@@ -4462,7 +4463,7 @@
         </p:nvSpPr>
         <p:spPr>
           <a:xfrm>
-            <a:off x="3510609" y="2414930"/>
+            <a:off x="3497061" y="2031650"/>
             <a:ext cx="1531766" cy="276999"/>
           </a:xfrm>
           <a:prstGeom prst="rect">
@@ -4890,7 +4891,7 @@
         </p:nvGrpSpPr>
         <p:grpSpPr>
           <a:xfrm>
-            <a:off x="155448" y="5391088"/>
+            <a:off x="6136702" y="5472276"/>
             <a:ext cx="5314208" cy="1270530"/>
             <a:chOff x="155448" y="5391088"/>
             <a:chExt cx="5314208" cy="1270530"/>
@@ -5378,7 +5379,7 @@
             </a:solidFill>
             <a:ln w="38100">
               <a:solidFill>
-                <a:srgbClr val="FFFF00"/>
+                <a:srgbClr val="FFC000"/>
               </a:solidFill>
             </a:ln>
           </p:spPr>
@@ -5425,7 +5426,7 @@
             </a:solidFill>
             <a:ln w="38100">
               <a:solidFill>
-                <a:srgbClr val="C00000"/>
+                <a:srgbClr val="FFC000"/>
               </a:solidFill>
             </a:ln>
           </p:spPr>
@@ -5527,48 +5528,6 @@
           </p:txBody>
         </p:sp>
       </p:grpSp>
-      <p:cxnSp>
-        <p:nvCxnSpPr>
-          <p:cNvPr id="70" name="Straight Connector 69">
-            <a:extLst>
-              <a:ext uri="{FF2B5EF4-FFF2-40B4-BE49-F238E27FC236}">
-                <a16:creationId xmlns:a16="http://schemas.microsoft.com/office/drawing/2014/main" id="{D272FBA1-BE63-D041-BE0E-887C84673DAC}"/>
-              </a:ext>
-            </a:extLst>
-          </p:cNvPr>
-          <p:cNvCxnSpPr>
-            <a:cxnSpLocks/>
-          </p:cNvCxnSpPr>
-          <p:nvPr/>
-        </p:nvCxnSpPr>
-        <p:spPr>
-          <a:xfrm flipH="1" flipV="1">
-            <a:off x="4496531" y="3616368"/>
-            <a:ext cx="287325" cy="1492978"/>
-          </a:xfrm>
-          <a:prstGeom prst="line">
-            <a:avLst/>
-          </a:prstGeom>
-          <a:ln>
-            <a:headEnd type="none" w="lg" len="lg"/>
-            <a:tailEnd type="stealth" w="lg" len="lg"/>
-          </a:ln>
-        </p:spPr>
-        <p:style>
-          <a:lnRef idx="1">
-            <a:schemeClr val="accent1"/>
-          </a:lnRef>
-          <a:fillRef idx="0">
-            <a:schemeClr val="accent1"/>
-          </a:fillRef>
-          <a:effectRef idx="0">
-            <a:schemeClr val="accent1"/>
-          </a:effectRef>
-          <a:fontRef idx="minor">
-            <a:schemeClr val="tx1"/>
-          </a:fontRef>
-        </p:style>
-      </p:cxnSp>
       <p:sp>
         <p:nvSpPr>
           <p:cNvPr id="12" name="Rectangle 11">
@@ -5667,7 +5626,7 @@
         <p:spPr>
           <a:xfrm>
             <a:off x="5733348" y="480613"/>
-            <a:ext cx="5929384" cy="6011624"/>
+            <a:ext cx="5929384" cy="4924449"/>
           </a:xfrm>
           <a:prstGeom prst="rect">
             <a:avLst/>
@@ -5750,7 +5709,7 @@
         <p:spPr>
           <a:xfrm>
             <a:off x="3510609" y="3477868"/>
-            <a:ext cx="911981" cy="276999"/>
+            <a:ext cx="988925" cy="276999"/>
           </a:xfrm>
           <a:prstGeom prst="rect">
             <a:avLst/>
@@ -5775,7 +5734,7 @@
                 <a:latin typeface="Arial" panose="020B0604020202020204" pitchFamily="34" charset="0"/>
                 <a:cs typeface="Arial" panose="020B0604020202020204" pitchFamily="34" charset="0"/>
               </a:rPr>
-              <a:t>Future API</a:t>
+              <a:t>Future APIs</a:t>
             </a:r>
           </a:p>
         </p:txBody>
@@ -5987,10 +5946,10 @@
         </p:nvGrpSpPr>
         <p:grpSpPr>
           <a:xfrm>
-            <a:off x="6038164" y="4669781"/>
-            <a:ext cx="1371600" cy="1604216"/>
+            <a:off x="9536657" y="3835852"/>
+            <a:ext cx="1371600" cy="1433099"/>
             <a:chOff x="6015568" y="2573324"/>
-            <a:chExt cx="1371600" cy="1604216"/>
+            <a:chExt cx="1371600" cy="1433099"/>
           </a:xfrm>
         </p:grpSpPr>
         <p:sp>
@@ -6008,7 +5967,7 @@
           <p:spPr>
             <a:xfrm>
               <a:off x="6015568" y="2573324"/>
-              <a:ext cx="1371600" cy="1604216"/>
+              <a:ext cx="1371600" cy="1433099"/>
             </a:xfrm>
             <a:prstGeom prst="rect">
               <a:avLst/>
@@ -6552,6 +6511,196 @@
           </p:txBody>
         </p:sp>
       </p:grpSp>
+      <p:sp>
+        <p:nvSpPr>
+          <p:cNvPr id="85" name="Rectangle 84">
+            <a:extLst>
+              <a:ext uri="{FF2B5EF4-FFF2-40B4-BE49-F238E27FC236}">
+                <a16:creationId xmlns:a16="http://schemas.microsoft.com/office/drawing/2014/main" id="{D9DB12F3-64E1-424A-8831-75D6C5240EAC}"/>
+              </a:ext>
+            </a:extLst>
+          </p:cNvPr>
+          <p:cNvSpPr/>
+          <p:nvPr/>
+        </p:nvSpPr>
+        <p:spPr>
+          <a:xfrm>
+            <a:off x="155448" y="5035775"/>
+            <a:ext cx="1264011" cy="276999"/>
+          </a:xfrm>
+          <a:prstGeom prst="rect">
+            <a:avLst/>
+          </a:prstGeom>
+          <a:solidFill>
+            <a:schemeClr val="bg1"/>
+          </a:solidFill>
+          <a:ln w="38100">
+            <a:solidFill>
+              <a:srgbClr val="FFC000"/>
+            </a:solidFill>
+          </a:ln>
+        </p:spPr>
+        <p:txBody>
+          <a:bodyPr wrap="square">
+            <a:spAutoFit/>
+          </a:bodyPr>
+          <a:lstStyle/>
+          <a:p>
+            <a:pPr algn="ctr"/>
+            <a:r>
+              <a:rPr lang="en-US" sz="1200" dirty="0">
+                <a:latin typeface="Arial" panose="020B0604020202020204" pitchFamily="34" charset="0"/>
+                <a:cs typeface="Arial" panose="020B0604020202020204" pitchFamily="34" charset="0"/>
+              </a:rPr>
+              <a:t>Need Token/pin</a:t>
+            </a:r>
+            <a:endParaRPr lang="en-US" sz="1200" dirty="0"/>
+          </a:p>
+        </p:txBody>
+      </p:sp>
+      <p:cxnSp>
+        <p:nvCxnSpPr>
+          <p:cNvPr id="13" name="Elbow Connector 12">
+            <a:extLst>
+              <a:ext uri="{FF2B5EF4-FFF2-40B4-BE49-F238E27FC236}">
+                <a16:creationId xmlns:a16="http://schemas.microsoft.com/office/drawing/2014/main" id="{E49B0032-3016-664A-95A5-8B685B7ED4D2}"/>
+              </a:ext>
+            </a:extLst>
+          </p:cNvPr>
+          <p:cNvCxnSpPr>
+            <a:cxnSpLocks/>
+            <a:stCxn id="85" idx="3"/>
+            <a:endCxn id="26" idx="1"/>
+          </p:cNvCxnSpPr>
+          <p:nvPr/>
+        </p:nvCxnSpPr>
+        <p:spPr>
+          <a:xfrm flipV="1">
+            <a:off x="1419459" y="2170150"/>
+            <a:ext cx="2077602" cy="3004125"/>
+          </a:xfrm>
+          <a:prstGeom prst="bentConnector3">
+            <a:avLst>
+              <a:gd name="adj1" fmla="val 26554"/>
+            </a:avLst>
+          </a:prstGeom>
+          <a:ln w="38100">
+            <a:solidFill>
+              <a:srgbClr val="00B050"/>
+            </a:solidFill>
+            <a:tailEnd type="triangle"/>
+          </a:ln>
+        </p:spPr>
+        <p:style>
+          <a:lnRef idx="1">
+            <a:schemeClr val="accent1"/>
+          </a:lnRef>
+          <a:fillRef idx="0">
+            <a:schemeClr val="accent1"/>
+          </a:fillRef>
+          <a:effectRef idx="0">
+            <a:schemeClr val="accent1"/>
+          </a:effectRef>
+          <a:fontRef idx="minor">
+            <a:schemeClr val="tx1"/>
+          </a:fontRef>
+        </p:style>
+      </p:cxnSp>
+      <p:sp>
+        <p:nvSpPr>
+          <p:cNvPr id="99" name="Rectangle 98">
+            <a:extLst>
+              <a:ext uri="{FF2B5EF4-FFF2-40B4-BE49-F238E27FC236}">
+                <a16:creationId xmlns:a16="http://schemas.microsoft.com/office/drawing/2014/main" id="{8AEA6F65-C95E-1944-A16D-4B494249491D}"/>
+              </a:ext>
+            </a:extLst>
+          </p:cNvPr>
+          <p:cNvSpPr/>
+          <p:nvPr/>
+        </p:nvSpPr>
+        <p:spPr>
+          <a:xfrm>
+            <a:off x="149760" y="5383159"/>
+            <a:ext cx="1264011" cy="276999"/>
+          </a:xfrm>
+          <a:prstGeom prst="rect">
+            <a:avLst/>
+          </a:prstGeom>
+          <a:solidFill>
+            <a:schemeClr val="bg1"/>
+          </a:solidFill>
+          <a:ln w="38100">
+            <a:solidFill>
+              <a:srgbClr val="FFC000"/>
+            </a:solidFill>
+          </a:ln>
+        </p:spPr>
+        <p:txBody>
+          <a:bodyPr wrap="square">
+            <a:spAutoFit/>
+          </a:bodyPr>
+          <a:lstStyle/>
+          <a:p>
+            <a:pPr algn="ctr"/>
+            <a:r>
+              <a:rPr lang="en-US" sz="1200" dirty="0">
+                <a:latin typeface="Arial" panose="020B0604020202020204" pitchFamily="34" charset="0"/>
+                <a:cs typeface="Arial" panose="020B0604020202020204" pitchFamily="34" charset="0"/>
+              </a:rPr>
+              <a:t>Update info</a:t>
+            </a:r>
+            <a:endParaRPr lang="en-US" sz="1200" dirty="0"/>
+          </a:p>
+        </p:txBody>
+      </p:sp>
+      <p:cxnSp>
+        <p:nvCxnSpPr>
+          <p:cNvPr id="102" name="Elbow Connector 101">
+            <a:extLst>
+              <a:ext uri="{FF2B5EF4-FFF2-40B4-BE49-F238E27FC236}">
+                <a16:creationId xmlns:a16="http://schemas.microsoft.com/office/drawing/2014/main" id="{86185922-0933-6342-87AF-9A4AF02C1420}"/>
+              </a:ext>
+            </a:extLst>
+          </p:cNvPr>
+          <p:cNvCxnSpPr>
+            <a:cxnSpLocks/>
+            <a:stCxn id="99" idx="3"/>
+            <a:endCxn id="23" idx="1"/>
+          </p:cNvCxnSpPr>
+          <p:nvPr/>
+        </p:nvCxnSpPr>
+        <p:spPr>
+          <a:xfrm flipV="1">
+            <a:off x="1413771" y="2530722"/>
+            <a:ext cx="2096838" cy="2990937"/>
+          </a:xfrm>
+          <a:prstGeom prst="bentConnector3">
+            <a:avLst>
+              <a:gd name="adj1" fmla="val 30845"/>
+            </a:avLst>
+          </a:prstGeom>
+          <a:ln w="38100">
+            <a:solidFill>
+              <a:srgbClr val="00B050"/>
+            </a:solidFill>
+            <a:tailEnd type="triangle"/>
+          </a:ln>
+        </p:spPr>
+        <p:style>
+          <a:lnRef idx="1">
+            <a:schemeClr val="accent1"/>
+          </a:lnRef>
+          <a:fillRef idx="0">
+            <a:schemeClr val="accent1"/>
+          </a:fillRef>
+          <a:effectRef idx="0">
+            <a:schemeClr val="accent1"/>
+          </a:effectRef>
+          <a:fontRef idx="minor">
+            <a:schemeClr val="tx1"/>
+          </a:fontRef>
+        </p:style>
+      </p:cxnSp>
     </p:spTree>
     <p:extLst>
       <p:ext uri="{BB962C8B-B14F-4D97-AF65-F5344CB8AC3E}">

</xml_diff>

<commit_message>
verify participant is performed in the site manager app
</commit_message>
<xml_diff>
--- a/ArchitectureOverviewStatus.pptx
+++ b/ArchitectureOverviewStatus.pptx
@@ -3925,7 +3925,7 @@
         </p:nvSpPr>
         <p:spPr>
           <a:xfrm>
-            <a:off x="3041151" y="3183134"/>
+            <a:off x="3041151" y="3541681"/>
             <a:ext cx="1531766" cy="276999"/>
           </a:xfrm>
           <a:prstGeom prst="rect">
@@ -5148,7 +5148,7 @@
         </p:nvSpPr>
         <p:spPr>
           <a:xfrm>
-            <a:off x="3048488" y="3552730"/>
+            <a:off x="3041151" y="3173292"/>
             <a:ext cx="1394934" cy="276999"/>
           </a:xfrm>
           <a:prstGeom prst="rect">
@@ -5206,7 +5206,7 @@
           </a:xfrm>
           <a:prstGeom prst="bentConnector3">
             <a:avLst>
-              <a:gd name="adj1" fmla="val 50000"/>
+              <a:gd name="adj1" fmla="val 47131"/>
             </a:avLst>
           </a:prstGeom>
           <a:ln w="38100">
@@ -6009,10 +6009,10 @@
         </p:nvGrpSpPr>
         <p:grpSpPr>
           <a:xfrm>
-            <a:off x="122407" y="3168539"/>
-            <a:ext cx="2254090" cy="1680552"/>
-            <a:chOff x="68023" y="4983943"/>
-            <a:chExt cx="2254090" cy="1680552"/>
+            <a:off x="122407" y="3184919"/>
+            <a:ext cx="2254090" cy="1428035"/>
+            <a:chOff x="68023" y="5236459"/>
+            <a:chExt cx="2254090" cy="1428035"/>
           </a:xfrm>
         </p:grpSpPr>
         <p:grpSp>
@@ -6029,10 +6029,10 @@
           </p:nvGrpSpPr>
           <p:grpSpPr>
             <a:xfrm>
-              <a:off x="68023" y="4983943"/>
-              <a:ext cx="2254090" cy="1680552"/>
-              <a:chOff x="6005397" y="3057603"/>
-              <a:chExt cx="1371600" cy="1448086"/>
+              <a:off x="68023" y="5236459"/>
+              <a:ext cx="2254090" cy="1428035"/>
+              <a:chOff x="6005397" y="3275189"/>
+              <a:chExt cx="1371600" cy="1230499"/>
             </a:xfrm>
           </p:grpSpPr>
           <p:sp>
@@ -6049,8 +6049,8 @@
             </p:nvSpPr>
             <p:spPr>
               <a:xfrm>
-                <a:off x="6005397" y="3057603"/>
-                <a:ext cx="1371600" cy="1448086"/>
+                <a:off x="6005397" y="3275189"/>
+                <a:ext cx="1371600" cy="1230499"/>
               </a:xfrm>
               <a:prstGeom prst="rect">
                 <a:avLst/>
@@ -6145,7 +6145,7 @@
           </p:nvSpPr>
           <p:spPr>
             <a:xfrm>
-              <a:off x="155448" y="5035775"/>
+              <a:off x="151027" y="5347783"/>
               <a:ext cx="1321795" cy="276999"/>
             </a:xfrm>
             <a:prstGeom prst="rect">
@@ -6192,7 +6192,7 @@
           </p:nvSpPr>
           <p:spPr>
             <a:xfrm>
-              <a:off x="155448" y="5734009"/>
+              <a:off x="151027" y="5715455"/>
               <a:ext cx="2004653" cy="276999"/>
             </a:xfrm>
             <a:prstGeom prst="rect">
@@ -6227,53 +6227,6 @@
         </p:sp>
         <p:sp>
           <p:nvSpPr>
-            <p:cNvPr id="119" name="Rectangle 118">
-              <a:extLst>
-                <a:ext uri="{FF2B5EF4-FFF2-40B4-BE49-F238E27FC236}">
-                  <a16:creationId xmlns:a16="http://schemas.microsoft.com/office/drawing/2014/main" id="{00829BC2-345F-F640-9048-CE5C59E6F536}"/>
-                </a:ext>
-              </a:extLst>
-            </p:cNvPr>
-            <p:cNvSpPr/>
-            <p:nvPr/>
-          </p:nvSpPr>
-          <p:spPr>
-            <a:xfrm>
-              <a:off x="155448" y="5384892"/>
-              <a:ext cx="1321796" cy="276999"/>
-            </a:xfrm>
-            <a:prstGeom prst="rect">
-              <a:avLst/>
-            </a:prstGeom>
-            <a:solidFill>
-              <a:schemeClr val="bg1"/>
-            </a:solidFill>
-            <a:ln w="38100">
-              <a:solidFill>
-                <a:srgbClr val="FFC000"/>
-              </a:solidFill>
-            </a:ln>
-          </p:spPr>
-          <p:txBody>
-            <a:bodyPr wrap="square">
-              <a:spAutoFit/>
-            </a:bodyPr>
-            <a:lstStyle/>
-            <a:p>
-              <a:pPr algn="ctr"/>
-              <a:r>
-                <a:rPr lang="en-US" sz="1200" dirty="0">
-                  <a:latin typeface="Arial" panose="020B0604020202020204" pitchFamily="34" charset="0"/>
-                  <a:cs typeface="Arial" panose="020B0604020202020204" pitchFamily="34" charset="0"/>
-                </a:rPr>
-                <a:t>Verify participant</a:t>
-              </a:r>
-              <a:endParaRPr lang="en-US" sz="1200" dirty="0"/>
-            </a:p>
-          </p:txBody>
-        </p:sp>
-        <p:sp>
-          <p:nvSpPr>
             <p:cNvPr id="198" name="Rectangle 197">
               <a:extLst>
                 <a:ext uri="{FF2B5EF4-FFF2-40B4-BE49-F238E27FC236}">
@@ -6286,7 +6239,7 @@
           </p:nvSpPr>
           <p:spPr>
             <a:xfrm>
-              <a:off x="155449" y="6083127"/>
+              <a:off x="151027" y="6083127"/>
               <a:ext cx="1321796" cy="276999"/>
             </a:xfrm>
             <a:prstGeom prst="rect">
@@ -6338,8 +6291,8 @@
         </p:nvCxnSpPr>
         <p:spPr>
           <a:xfrm>
-            <a:off x="1531629" y="4406223"/>
-            <a:ext cx="1509522" cy="68343"/>
+            <a:off x="1527207" y="4170087"/>
+            <a:ext cx="1513944" cy="304479"/>
           </a:xfrm>
           <a:prstGeom prst="bentConnector3">
             <a:avLst>
@@ -6379,15 +6332,15 @@
           </p:cNvPr>
           <p:cNvCxnSpPr>
             <a:cxnSpLocks/>
-            <a:stCxn id="119" idx="3"/>
-            <a:endCxn id="118" idx="1"/>
+            <a:stCxn id="53" idx="1"/>
+            <a:endCxn id="118" idx="3"/>
           </p:cNvCxnSpPr>
           <p:nvPr/>
         </p:nvCxnSpPr>
         <p:spPr>
-          <a:xfrm flipV="1">
-            <a:off x="1531628" y="3691230"/>
-            <a:ext cx="1516860" cy="16758"/>
+          <a:xfrm rot="10800000">
+            <a:off x="4436086" y="3311793"/>
+            <a:ext cx="1594741" cy="542589"/>
           </a:xfrm>
           <a:prstGeom prst="bentConnector3">
             <a:avLst>
@@ -6433,9 +6386,9 @@
           <p:nvPr/>
         </p:nvCxnSpPr>
         <p:spPr>
-          <a:xfrm flipV="1">
-            <a:off x="1531627" y="3321634"/>
-            <a:ext cx="1509524" cy="37237"/>
+          <a:xfrm>
+            <a:off x="1527206" y="3434743"/>
+            <a:ext cx="1513945" cy="245438"/>
           </a:xfrm>
           <a:prstGeom prst="bentConnector3">
             <a:avLst>
@@ -6482,8 +6435,8 @@
         </p:nvCxnSpPr>
         <p:spPr>
           <a:xfrm>
-            <a:off x="2214485" y="4057105"/>
-            <a:ext cx="826666" cy="37090"/>
+            <a:off x="2210064" y="3802415"/>
+            <a:ext cx="831087" cy="291780"/>
           </a:xfrm>
           <a:prstGeom prst="bentConnector3">
             <a:avLst>

</xml_diff>

<commit_message>
update w/comments from Montse/Nicole
</commit_message>
<xml_diff>
--- a/ArchitectureOverviewStatus.pptx
+++ b/ArchitectureOverviewStatus.pptx
@@ -3340,12 +3340,12 @@
         </p:nvSpPr>
         <p:spPr>
           <a:xfrm rot="10800000">
-            <a:off x="155448" y="512064"/>
-            <a:ext cx="4525369" cy="4342091"/>
+            <a:off x="155447" y="512063"/>
+            <a:ext cx="4525369" cy="3984725"/>
           </a:xfrm>
           <a:prstGeom prst="corner">
             <a:avLst>
-              <a:gd name="adj1" fmla="val 59392"/>
+              <a:gd name="adj1" fmla="val 64454"/>
               <a:gd name="adj2" fmla="val 49133"/>
             </a:avLst>
           </a:prstGeom>
@@ -3401,9 +3401,9 @@
         <p:grpSpPr>
           <a:xfrm>
             <a:off x="499257" y="678807"/>
-            <a:ext cx="1371600" cy="2293710"/>
+            <a:ext cx="1418533" cy="2293710"/>
             <a:chOff x="499257" y="259492"/>
-            <a:chExt cx="1371600" cy="2293710"/>
+            <a:chExt cx="1418533" cy="2293710"/>
           </a:xfrm>
         </p:grpSpPr>
         <p:sp>
@@ -3508,7 +3508,7 @@
           <p:spPr>
             <a:xfrm>
               <a:off x="510834" y="848499"/>
-              <a:ext cx="1354187" cy="276999"/>
+              <a:ext cx="1354187" cy="461665"/>
             </a:xfrm>
             <a:prstGeom prst="rect">
               <a:avLst/>
@@ -3534,15 +3534,18 @@
                 </a:rPr>
                 <a:t>Firestore</a:t>
               </a:r>
-              <a:endParaRPr lang="en-US" sz="1200" dirty="0">
-                <a:solidFill>
-                  <a:schemeClr val="bg1">
-                    <a:lumMod val="50000"/>
-                  </a:schemeClr>
-                </a:solidFill>
-                <a:latin typeface="Arial" panose="020B0604020202020204" pitchFamily="34" charset="0"/>
-                <a:cs typeface="Arial" panose="020B0604020202020204" pitchFamily="34" charset="0"/>
-              </a:endParaRPr>
+              <a:r>
+                <a:rPr lang="en-US" sz="1200" dirty="0">
+                  <a:solidFill>
+                    <a:schemeClr val="bg1">
+                      <a:lumMod val="50000"/>
+                    </a:schemeClr>
+                  </a:solidFill>
+                  <a:latin typeface="Arial" panose="020B0604020202020204" pitchFamily="34" charset="0"/>
+                  <a:cs typeface="Arial" panose="020B0604020202020204" pitchFamily="34" charset="0"/>
+                </a:rPr>
+                <a:t> database</a:t>
+              </a:r>
             </a:p>
           </p:txBody>
         </p:sp>
@@ -3561,7 +3564,7 @@
           <p:spPr>
             <a:xfrm>
               <a:off x="529268" y="1168137"/>
-              <a:ext cx="1311578" cy="1384995"/>
+              <a:ext cx="1388522" cy="1384995"/>
             </a:xfrm>
             <a:prstGeom prst="rect">
               <a:avLst/>
@@ -3605,7 +3608,7 @@
                   <a:latin typeface="Arial" panose="020B0604020202020204" pitchFamily="34" charset="0"/>
                   <a:cs typeface="Arial" panose="020B0604020202020204" pitchFamily="34" charset="0"/>
                 </a:rPr>
-                <a:t>Questionnaire</a:t>
+                <a:t>Questionnaires</a:t>
               </a:r>
             </a:p>
             <a:p>
@@ -3653,47 +3656,6 @@
           </p:txBody>
         </p:sp>
       </p:grpSp>
-      <p:cxnSp>
-        <p:nvCxnSpPr>
-          <p:cNvPr id="36" name="Straight Connector 35">
-            <a:extLst>
-              <a:ext uri="{FF2B5EF4-FFF2-40B4-BE49-F238E27FC236}">
-                <a16:creationId xmlns:a16="http://schemas.microsoft.com/office/drawing/2014/main" id="{3AEABF02-C140-1D43-ADE9-248A2DBD8377}"/>
-              </a:ext>
-            </a:extLst>
-          </p:cNvPr>
-          <p:cNvCxnSpPr>
-            <a:cxnSpLocks/>
-          </p:cNvCxnSpPr>
-          <p:nvPr/>
-        </p:nvCxnSpPr>
-        <p:spPr>
-          <a:xfrm flipH="1">
-            <a:off x="1874111" y="1856045"/>
-            <a:ext cx="866220" cy="0"/>
-          </a:xfrm>
-          <a:prstGeom prst="line">
-            <a:avLst/>
-          </a:prstGeom>
-          <a:ln>
-            <a:tailEnd type="stealth" w="lg" len="lg"/>
-          </a:ln>
-        </p:spPr>
-        <p:style>
-          <a:lnRef idx="1">
-            <a:schemeClr val="accent1"/>
-          </a:lnRef>
-          <a:fillRef idx="0">
-            <a:schemeClr val="accent1"/>
-          </a:fillRef>
-          <a:effectRef idx="0">
-            <a:schemeClr val="accent1"/>
-          </a:effectRef>
-          <a:fontRef idx="minor">
-            <a:schemeClr val="tx1"/>
-          </a:fontRef>
-        </p:style>
-      </p:cxnSp>
       <p:sp>
         <p:nvSpPr>
           <p:cNvPr id="11" name="Rectangle 10">
@@ -3709,7 +3671,7 @@
         <p:spPr>
           <a:xfrm>
             <a:off x="2740331" y="750191"/>
-            <a:ext cx="1371600" cy="3991232"/>
+            <a:ext cx="1371600" cy="3673489"/>
           </a:xfrm>
           <a:prstGeom prst="rect">
             <a:avLst/>
@@ -3833,7 +3795,7 @@
         </p:nvSpPr>
         <p:spPr>
           <a:xfrm>
-            <a:off x="3041151" y="2030201"/>
+            <a:off x="3041151" y="1640238"/>
             <a:ext cx="1121397" cy="276999"/>
           </a:xfrm>
           <a:prstGeom prst="rect">
@@ -3879,7 +3841,7 @@
         </p:nvSpPr>
         <p:spPr>
           <a:xfrm>
-            <a:off x="3041151" y="2414512"/>
+            <a:off x="3041151" y="2024549"/>
             <a:ext cx="1156086" cy="276999"/>
           </a:xfrm>
           <a:prstGeom prst="rect">
@@ -3925,7 +3887,7 @@
         </p:nvSpPr>
         <p:spPr>
           <a:xfrm>
-            <a:off x="3041151" y="3541681"/>
+            <a:off x="3041151" y="3151718"/>
             <a:ext cx="1531766" cy="276999"/>
           </a:xfrm>
           <a:prstGeom prst="rect">
@@ -3974,7 +3936,7 @@
         </p:nvSpPr>
         <p:spPr>
           <a:xfrm>
-            <a:off x="3041151" y="3955695"/>
+            <a:off x="3041151" y="3565732"/>
             <a:ext cx="1199367" cy="276999"/>
           </a:xfrm>
           <a:prstGeom prst="rect">
@@ -4475,7 +4437,7 @@
         </p:nvSpPr>
         <p:spPr>
           <a:xfrm>
-            <a:off x="3041151" y="4336066"/>
+            <a:off x="3041151" y="3946103"/>
             <a:ext cx="988925" cy="276999"/>
           </a:xfrm>
           <a:prstGeom prst="rect">
@@ -4520,8 +4482,8 @@
         </p:nvGrpSpPr>
         <p:grpSpPr>
           <a:xfrm>
-            <a:off x="9536657" y="3835852"/>
-            <a:ext cx="1371600" cy="1433099"/>
+            <a:off x="9536657" y="3234960"/>
+            <a:ext cx="1371600" cy="1188720"/>
             <a:chOff x="6015568" y="2573324"/>
             <a:chExt cx="1371600" cy="1433099"/>
           </a:xfrm>
@@ -4591,7 +4553,7 @@
           </p:nvSpPr>
           <p:spPr>
             <a:xfrm>
-              <a:off x="6015568" y="3051295"/>
+              <a:off x="6015568" y="2573324"/>
               <a:ext cx="1371599" cy="276999"/>
             </a:xfrm>
             <a:prstGeom prst="rect">
@@ -4621,36 +4583,6 @@
             </a:p>
           </p:txBody>
         </p:sp>
-        <p:pic>
-          <p:nvPicPr>
-            <p:cNvPr id="83" name="Picture 82">
-              <a:extLst>
-                <a:ext uri="{FF2B5EF4-FFF2-40B4-BE49-F238E27FC236}">
-                  <a16:creationId xmlns:a16="http://schemas.microsoft.com/office/drawing/2014/main" id="{E4B891D9-6B53-0840-80CD-7ABAA47819A8}"/>
-                </a:ext>
-              </a:extLst>
-            </p:cNvPr>
-            <p:cNvPicPr>
-              <a:picLocks noChangeAspect="1"/>
-            </p:cNvPicPr>
-            <p:nvPr/>
-          </p:nvPicPr>
-          <p:blipFill>
-            <a:blip r:embed="rId7"/>
-            <a:stretch>
-              <a:fillRect/>
-            </a:stretch>
-          </p:blipFill>
-          <p:spPr>
-            <a:xfrm>
-              <a:off x="6498168" y="2681091"/>
-              <a:ext cx="406400" cy="406400"/>
-            </a:xfrm>
-            <a:prstGeom prst="rect">
-              <a:avLst/>
-            </a:prstGeom>
-          </p:spPr>
-        </p:pic>
         <p:sp>
           <p:nvSpPr>
             <p:cNvPr id="84" name="Rectangle 83">
@@ -4665,8 +4597,8 @@
           </p:nvSpPr>
           <p:spPr>
             <a:xfrm>
-              <a:off x="6140670" y="3350537"/>
-              <a:ext cx="1121397" cy="461665"/>
+              <a:off x="6140670" y="3019818"/>
+              <a:ext cx="1121397" cy="779205"/>
             </a:xfrm>
             <a:prstGeom prst="rect">
               <a:avLst/>
@@ -4694,6 +4626,9 @@
                 </a:rPr>
                 <a:t>NORC Dashboard</a:t>
               </a:r>
+            </a:p>
+            <a:p>
+              <a:pPr algn="ctr"/>
               <a:endParaRPr lang="en-US" sz="1200" dirty="0"/>
             </a:p>
           </p:txBody>
@@ -4713,10 +4648,10 @@
         </p:nvGrpSpPr>
         <p:grpSpPr>
           <a:xfrm>
-            <a:off x="9541181" y="615825"/>
-            <a:ext cx="1371600" cy="1604216"/>
+            <a:off x="9541181" y="615824"/>
+            <a:ext cx="1371600" cy="1188720"/>
             <a:chOff x="6015568" y="2573324"/>
-            <a:chExt cx="1371600" cy="1604216"/>
+            <a:chExt cx="1371600" cy="1178347"/>
           </a:xfrm>
         </p:grpSpPr>
         <p:sp>
@@ -4734,7 +4669,7 @@
           <p:spPr>
             <a:xfrm>
               <a:off x="6015568" y="2573324"/>
-              <a:ext cx="1371600" cy="1604216"/>
+              <a:ext cx="1371600" cy="1178347"/>
             </a:xfrm>
             <a:prstGeom prst="rect">
               <a:avLst/>
@@ -4784,7 +4719,7 @@
           </p:nvSpPr>
           <p:spPr>
             <a:xfrm>
-              <a:off x="6022330" y="3051295"/>
+              <a:off x="6022330" y="2573324"/>
               <a:ext cx="1364838" cy="461665"/>
             </a:xfrm>
             <a:prstGeom prst="rect">
@@ -4814,36 +4749,6 @@
             </a:p>
           </p:txBody>
         </p:sp>
-        <p:pic>
-          <p:nvPicPr>
-            <p:cNvPr id="89" name="Picture 88">
-              <a:extLst>
-                <a:ext uri="{FF2B5EF4-FFF2-40B4-BE49-F238E27FC236}">
-                  <a16:creationId xmlns:a16="http://schemas.microsoft.com/office/drawing/2014/main" id="{62DA907B-24B2-FF45-8D67-9F96D5F35E34}"/>
-                </a:ext>
-              </a:extLst>
-            </p:cNvPr>
-            <p:cNvPicPr>
-              <a:picLocks noChangeAspect="1"/>
-            </p:cNvPicPr>
-            <p:nvPr/>
-          </p:nvPicPr>
-          <p:blipFill>
-            <a:blip r:embed="rId7"/>
-            <a:stretch>
-              <a:fillRect/>
-            </a:stretch>
-          </p:blipFill>
-          <p:spPr>
-            <a:xfrm>
-              <a:off x="6498168" y="2681091"/>
-              <a:ext cx="406400" cy="406400"/>
-            </a:xfrm>
-            <a:prstGeom prst="rect">
-              <a:avLst/>
-            </a:prstGeom>
-          </p:spPr>
-        </p:pic>
         <p:sp>
           <p:nvSpPr>
             <p:cNvPr id="90" name="Rectangle 89">
@@ -4858,7 +4763,7 @@
           </p:nvSpPr>
           <p:spPr>
             <a:xfrm>
-              <a:off x="6140670" y="3572608"/>
+              <a:off x="6140670" y="3089280"/>
               <a:ext cx="1121397" cy="461665"/>
             </a:xfrm>
             <a:prstGeom prst="rect">
@@ -4906,10 +4811,10 @@
         </p:nvGrpSpPr>
         <p:grpSpPr>
           <a:xfrm>
-            <a:off x="9550910" y="2376131"/>
-            <a:ext cx="1371600" cy="1378736"/>
+            <a:off x="9550910" y="1945055"/>
+            <a:ext cx="1371600" cy="1188720"/>
             <a:chOff x="6015568" y="2573324"/>
-            <a:chExt cx="1371600" cy="1378736"/>
+            <a:chExt cx="1371600" cy="953024"/>
           </a:xfrm>
         </p:grpSpPr>
         <p:sp>
@@ -4927,7 +4832,7 @@
           <p:spPr>
             <a:xfrm>
               <a:off x="6015568" y="2573324"/>
-              <a:ext cx="1371600" cy="1378736"/>
+              <a:ext cx="1371600" cy="953024"/>
             </a:xfrm>
             <a:prstGeom prst="rect">
               <a:avLst/>
@@ -4977,7 +4882,7 @@
           </p:nvSpPr>
           <p:spPr>
             <a:xfrm>
-              <a:off x="6015568" y="3051295"/>
+              <a:off x="6015568" y="2573324"/>
               <a:ext cx="1361871" cy="276999"/>
             </a:xfrm>
             <a:prstGeom prst="rect">
@@ -5007,36 +4912,6 @@
             </a:p>
           </p:txBody>
         </p:sp>
-        <p:pic>
-          <p:nvPicPr>
-            <p:cNvPr id="94" name="Picture 93">
-              <a:extLst>
-                <a:ext uri="{FF2B5EF4-FFF2-40B4-BE49-F238E27FC236}">
-                  <a16:creationId xmlns:a16="http://schemas.microsoft.com/office/drawing/2014/main" id="{E40B4AA4-EACA-1B47-ADBC-C5C1FCFB6DE8}"/>
-                </a:ext>
-              </a:extLst>
-            </p:cNvPr>
-            <p:cNvPicPr>
-              <a:picLocks noChangeAspect="1"/>
-            </p:cNvPicPr>
-            <p:nvPr/>
-          </p:nvPicPr>
-          <p:blipFill>
-            <a:blip r:embed="rId7"/>
-            <a:stretch>
-              <a:fillRect/>
-            </a:stretch>
-          </p:blipFill>
-          <p:spPr>
-            <a:xfrm>
-              <a:off x="6498168" y="2681091"/>
-              <a:ext cx="406400" cy="406400"/>
-            </a:xfrm>
-            <a:prstGeom prst="rect">
-              <a:avLst/>
-            </a:prstGeom>
-          </p:spPr>
-        </p:pic>
         <p:sp>
           <p:nvSpPr>
             <p:cNvPr id="95" name="Rectangle 94">
@@ -5051,7 +4926,7 @@
           </p:nvSpPr>
           <p:spPr>
             <a:xfrm>
-              <a:off x="6140670" y="3358851"/>
+              <a:off x="6140670" y="2914711"/>
               <a:ext cx="1121397" cy="461665"/>
             </a:xfrm>
             <a:prstGeom prst="rect">
@@ -5099,7 +4974,7 @@
         </p:nvSpPr>
         <p:spPr>
           <a:xfrm>
-            <a:off x="3041151" y="2798823"/>
+            <a:off x="3041151" y="2408860"/>
             <a:ext cx="1300356" cy="276999"/>
           </a:xfrm>
           <a:prstGeom prst="rect">
@@ -5148,7 +5023,7 @@
         </p:nvSpPr>
         <p:spPr>
           <a:xfrm>
-            <a:off x="3041151" y="3173292"/>
+            <a:off x="3041151" y="2783329"/>
             <a:ext cx="1394934" cy="276999"/>
           </a:xfrm>
           <a:prstGeom prst="rect">
@@ -5201,12 +5076,12 @@
         </p:nvCxnSpPr>
         <p:spPr>
           <a:xfrm rot="10800000">
-            <a:off x="4341508" y="2937323"/>
-            <a:ext cx="1689319" cy="917058"/>
+            <a:off x="4341508" y="2547361"/>
+            <a:ext cx="1689319" cy="2186995"/>
           </a:xfrm>
           <a:prstGeom prst="bentConnector3">
             <a:avLst>
-              <a:gd name="adj1" fmla="val 47131"/>
+              <a:gd name="adj1" fmla="val 50000"/>
             </a:avLst>
           </a:prstGeom>
           <a:ln w="38100">
@@ -5248,9 +5123,9 @@
           <p:nvPr/>
         </p:nvCxnSpPr>
         <p:spPr>
-          <a:xfrm rot="10800000" flipV="1">
-            <a:off x="4197238" y="1809958"/>
-            <a:ext cx="1833589" cy="743054"/>
+          <a:xfrm rot="10800000">
+            <a:off x="4197238" y="2163049"/>
+            <a:ext cx="1833589" cy="163360"/>
           </a:xfrm>
           <a:prstGeom prst="bentConnector3">
             <a:avLst>
@@ -5296,13 +5171,13 @@
           <p:nvPr/>
         </p:nvCxnSpPr>
         <p:spPr>
-          <a:xfrm rot="10800000" flipV="1">
-            <a:off x="4162548" y="1809957"/>
-            <a:ext cx="1868278" cy="358743"/>
+          <a:xfrm rot="10800000">
+            <a:off x="4162548" y="1778739"/>
+            <a:ext cx="1868278" cy="547671"/>
           </a:xfrm>
           <a:prstGeom prst="bentConnector3">
             <a:avLst>
-              <a:gd name="adj1" fmla="val 50000"/>
+              <a:gd name="adj1" fmla="val 48526"/>
             </a:avLst>
           </a:prstGeom>
           <a:ln w="38100">
@@ -5345,12 +5220,12 @@
         </p:nvCxnSpPr>
         <p:spPr>
           <a:xfrm rot="10800000" flipV="1">
-            <a:off x="4030076" y="4037526"/>
-            <a:ext cx="3786262" cy="437039"/>
+            <a:off x="4030076" y="3115417"/>
+            <a:ext cx="3786262" cy="969186"/>
           </a:xfrm>
           <a:prstGeom prst="bentConnector3">
             <a:avLst>
-              <a:gd name="adj1" fmla="val 4080"/>
+              <a:gd name="adj1" fmla="val 7737"/>
             </a:avLst>
           </a:prstGeom>
           <a:ln w="38100">
@@ -5386,19 +5261,18 @@
           </p:cNvPr>
           <p:cNvCxnSpPr>
             <a:cxnSpLocks/>
-            <a:stCxn id="40" idx="1"/>
             <a:endCxn id="78" idx="3"/>
           </p:cNvCxnSpPr>
           <p:nvPr/>
         </p:nvCxnSpPr>
         <p:spPr>
           <a:xfrm rot="10800000" flipV="1">
-            <a:off x="4030076" y="1980890"/>
-            <a:ext cx="3786262" cy="2493676"/>
+            <a:off x="4030076" y="2024549"/>
+            <a:ext cx="3786262" cy="2060054"/>
           </a:xfrm>
           <a:prstGeom prst="bentConnector3">
             <a:avLst>
-              <a:gd name="adj1" fmla="val 4420"/>
+              <a:gd name="adj1" fmla="val 7688"/>
             </a:avLst>
           </a:prstGeom>
           <a:ln w="38100">
@@ -5441,12 +5315,12 @@
         </p:nvCxnSpPr>
         <p:spPr>
           <a:xfrm rot="10800000" flipV="1">
-            <a:off x="4030077" y="1417932"/>
-            <a:ext cx="5511105" cy="3056633"/>
+            <a:off x="4030077" y="1210183"/>
+            <a:ext cx="5511105" cy="2874419"/>
           </a:xfrm>
           <a:prstGeom prst="bentConnector3">
             <a:avLst>
-              <a:gd name="adj1" fmla="val 3262"/>
+              <a:gd name="adj1" fmla="val 4128"/>
             </a:avLst>
           </a:prstGeom>
           <a:ln w="38100">
@@ -5489,12 +5363,12 @@
         </p:nvCxnSpPr>
         <p:spPr>
           <a:xfrm rot="10800000" flipV="1">
-            <a:off x="4030076" y="2992602"/>
-            <a:ext cx="5520834" cy="1481964"/>
+            <a:off x="4030076" y="2117807"/>
+            <a:ext cx="5520834" cy="1966795"/>
           </a:xfrm>
           <a:prstGeom prst="bentConnector3">
             <a:avLst>
-              <a:gd name="adj1" fmla="val 3578"/>
+              <a:gd name="adj1" fmla="val 4275"/>
             </a:avLst>
           </a:prstGeom>
           <a:ln w="38100">
@@ -5537,12 +5411,12 @@
         </p:nvCxnSpPr>
         <p:spPr>
           <a:xfrm rot="10800000" flipV="1">
-            <a:off x="4030077" y="4452322"/>
-            <a:ext cx="5506581" cy="22243"/>
+            <a:off x="4030077" y="3349841"/>
+            <a:ext cx="5506581" cy="734761"/>
           </a:xfrm>
           <a:prstGeom prst="bentConnector3">
             <a:avLst>
-              <a:gd name="adj1" fmla="val 50000"/>
+              <a:gd name="adj1" fmla="val 4090"/>
             </a:avLst>
           </a:prstGeom>
           <a:ln w="38100">
@@ -5581,10 +5455,10 @@
         </p:nvGrpSpPr>
         <p:grpSpPr>
           <a:xfrm>
-            <a:off x="7816338" y="3421056"/>
-            <a:ext cx="1371600" cy="1433099"/>
-            <a:chOff x="6015568" y="2573324"/>
-            <a:chExt cx="1371600" cy="1433099"/>
+            <a:off x="7816338" y="2976916"/>
+            <a:ext cx="1371600" cy="939171"/>
+            <a:chOff x="6015568" y="2573323"/>
+            <a:chExt cx="1371600" cy="939171"/>
           </a:xfrm>
         </p:grpSpPr>
         <p:sp>
@@ -5601,8 +5475,8 @@
           </p:nvSpPr>
           <p:spPr>
             <a:xfrm>
-              <a:off x="6015568" y="2573324"/>
-              <a:ext cx="1371600" cy="1433099"/>
+              <a:off x="6015568" y="2573323"/>
+              <a:ext cx="1371600" cy="939171"/>
             </a:xfrm>
             <a:prstGeom prst="rect">
               <a:avLst/>
@@ -5652,7 +5526,7 @@
           </p:nvSpPr>
           <p:spPr>
             <a:xfrm>
-              <a:off x="6015568" y="3051295"/>
+              <a:off x="6015568" y="2573324"/>
               <a:ext cx="1356733" cy="276999"/>
             </a:xfrm>
             <a:prstGeom prst="rect">
@@ -5682,36 +5556,6 @@
             </a:p>
           </p:txBody>
         </p:sp>
-        <p:pic>
-          <p:nvPicPr>
-            <p:cNvPr id="75" name="Picture 74">
-              <a:extLst>
-                <a:ext uri="{FF2B5EF4-FFF2-40B4-BE49-F238E27FC236}">
-                  <a16:creationId xmlns:a16="http://schemas.microsoft.com/office/drawing/2014/main" id="{E987E68F-6487-8346-A021-F1157C2FE78D}"/>
-                </a:ext>
-              </a:extLst>
-            </p:cNvPr>
-            <p:cNvPicPr>
-              <a:picLocks noChangeAspect="1"/>
-            </p:cNvPicPr>
-            <p:nvPr/>
-          </p:nvPicPr>
-          <p:blipFill>
-            <a:blip r:embed="rId7"/>
-            <a:stretch>
-              <a:fillRect/>
-            </a:stretch>
-          </p:blipFill>
-          <p:spPr>
-            <a:xfrm>
-              <a:off x="6498168" y="2681091"/>
-              <a:ext cx="406400" cy="406400"/>
-            </a:xfrm>
-            <a:prstGeom prst="rect">
-              <a:avLst/>
-            </a:prstGeom>
-          </p:spPr>
-        </p:pic>
         <p:sp>
           <p:nvSpPr>
             <p:cNvPr id="79" name="Rectangle 78">
@@ -5726,7 +5570,7 @@
           </p:nvSpPr>
           <p:spPr>
             <a:xfrm>
-              <a:off x="6140670" y="3350537"/>
+              <a:off x="6105003" y="2882116"/>
               <a:ext cx="1121397" cy="461665"/>
             </a:xfrm>
             <a:prstGeom prst="rect">
@@ -5774,10 +5618,10 @@
         </p:nvGrpSpPr>
         <p:grpSpPr>
           <a:xfrm>
-            <a:off x="6030826" y="3084905"/>
-            <a:ext cx="1371600" cy="1538952"/>
+            <a:off x="6030826" y="4139995"/>
+            <a:ext cx="1371600" cy="1188720"/>
             <a:chOff x="6015568" y="2573324"/>
-            <a:chExt cx="1371600" cy="1538952"/>
+            <a:chExt cx="1371600" cy="1188720"/>
           </a:xfrm>
         </p:grpSpPr>
         <p:sp>
@@ -5795,7 +5639,7 @@
           <p:spPr>
             <a:xfrm>
               <a:off x="6015568" y="2573324"/>
-              <a:ext cx="1371600" cy="1538952"/>
+              <a:ext cx="1371600" cy="1188720"/>
             </a:xfrm>
             <a:prstGeom prst="rect">
               <a:avLst/>
@@ -5845,7 +5689,7 @@
           </p:nvSpPr>
           <p:spPr>
             <a:xfrm>
-              <a:off x="6022906" y="3051295"/>
+              <a:off x="6022906" y="2573324"/>
               <a:ext cx="1364262" cy="276999"/>
             </a:xfrm>
             <a:prstGeom prst="rect">
@@ -5875,36 +5719,6 @@
             </a:p>
           </p:txBody>
         </p:sp>
-        <p:pic>
-          <p:nvPicPr>
-            <p:cNvPr id="58" name="Picture 57">
-              <a:extLst>
-                <a:ext uri="{FF2B5EF4-FFF2-40B4-BE49-F238E27FC236}">
-                  <a16:creationId xmlns:a16="http://schemas.microsoft.com/office/drawing/2014/main" id="{AFE0A63B-FB70-2E42-AB97-F4DA1FD3CDBB}"/>
-                </a:ext>
-              </a:extLst>
-            </p:cNvPr>
-            <p:cNvPicPr>
-              <a:picLocks noChangeAspect="1"/>
-            </p:cNvPicPr>
-            <p:nvPr/>
-          </p:nvPicPr>
-          <p:blipFill>
-            <a:blip r:embed="rId7"/>
-            <a:stretch>
-              <a:fillRect/>
-            </a:stretch>
-          </p:blipFill>
-          <p:spPr>
-            <a:xfrm>
-              <a:off x="6498168" y="2681091"/>
-              <a:ext cx="406400" cy="406400"/>
-            </a:xfrm>
-            <a:prstGeom prst="rect">
-              <a:avLst/>
-            </a:prstGeom>
-          </p:spPr>
-        </p:pic>
         <p:sp>
           <p:nvSpPr>
             <p:cNvPr id="65" name="Rectangle 64">
@@ -5919,7 +5733,7 @@
           </p:nvSpPr>
           <p:spPr>
             <a:xfrm>
-              <a:off x="6129384" y="3374218"/>
+              <a:off x="6129384" y="2864765"/>
               <a:ext cx="1121397" cy="646331"/>
             </a:xfrm>
             <a:prstGeom prst="rect">
@@ -6125,7 +5939,7 @@
                     <a:latin typeface="Arial" panose="020B0604020202020204" pitchFamily="34" charset="0"/>
                     <a:cs typeface="Arial" panose="020B0604020202020204" pitchFamily="34" charset="0"/>
                   </a:rPr>
-                  <a:t>IHCS use cases</a:t>
+                  <a:t>IHCS</a:t>
                 </a:r>
               </a:p>
             </p:txBody>
@@ -6266,7 +6080,7 @@
                   <a:latin typeface="Arial" panose="020B0604020202020204" pitchFamily="34" charset="0"/>
                   <a:cs typeface="Arial" panose="020B0604020202020204" pitchFamily="34" charset="0"/>
                 </a:rPr>
-                <a:t>Future needs</a:t>
+                <a:t>Additional needs</a:t>
               </a:r>
               <a:endParaRPr lang="en-US" sz="1200" dirty="0"/>
             </a:p>
@@ -6290,9 +6104,9 @@
           <p:nvPr/>
         </p:nvCxnSpPr>
         <p:spPr>
-          <a:xfrm>
-            <a:off x="1527207" y="4170087"/>
-            <a:ext cx="1513944" cy="304479"/>
+          <a:xfrm flipV="1">
+            <a:off x="1527207" y="4084603"/>
+            <a:ext cx="1513944" cy="85484"/>
           </a:xfrm>
           <a:prstGeom prst="bentConnector3">
             <a:avLst>
@@ -6339,12 +6153,12 @@
         </p:nvCxnSpPr>
         <p:spPr>
           <a:xfrm rot="10800000">
-            <a:off x="4436086" y="3311793"/>
-            <a:ext cx="1594741" cy="542589"/>
+            <a:off x="4436086" y="2921829"/>
+            <a:ext cx="1594741" cy="1812526"/>
           </a:xfrm>
           <a:prstGeom prst="bentConnector3">
             <a:avLst>
-              <a:gd name="adj1" fmla="val 50000"/>
+              <a:gd name="adj1" fmla="val 52752"/>
             </a:avLst>
           </a:prstGeom>
           <a:ln w="38100">
@@ -6386,9 +6200,9 @@
           <p:nvPr/>
         </p:nvCxnSpPr>
         <p:spPr>
-          <a:xfrm>
-            <a:off x="1527206" y="3434743"/>
-            <a:ext cx="1513945" cy="245438"/>
+          <a:xfrm flipV="1">
+            <a:off x="1527206" y="3290218"/>
+            <a:ext cx="1513945" cy="144525"/>
           </a:xfrm>
           <a:prstGeom prst="bentConnector3">
             <a:avLst>
@@ -6434,9 +6248,9 @@
           <p:nvPr/>
         </p:nvCxnSpPr>
         <p:spPr>
-          <a:xfrm>
-            <a:off x="2210064" y="3802415"/>
-            <a:ext cx="831087" cy="291780"/>
+          <a:xfrm flipV="1">
+            <a:off x="2210064" y="3704232"/>
+            <a:ext cx="831087" cy="98183"/>
           </a:xfrm>
           <a:prstGeom prst="bentConnector3">
             <a:avLst>
@@ -6621,7 +6435,7 @@
                   <a:latin typeface="Arial" panose="020B0604020202020204" pitchFamily="34" charset="0"/>
                   <a:cs typeface="Arial" panose="020B0604020202020204" pitchFamily="34" charset="0"/>
                 </a:rPr>
-                <a:t>Future needs</a:t>
+                <a:t>Additional needs</a:t>
               </a:r>
               <a:endParaRPr lang="en-US" sz="1200" dirty="0"/>
             </a:p>
@@ -6646,8 +6460,8 @@
         </p:nvCxnSpPr>
         <p:spPr>
           <a:xfrm rot="5400000" flipH="1" flipV="1">
-            <a:off x="1871862" y="3611933"/>
-            <a:ext cx="662620" cy="2664884"/>
+            <a:off x="1676881" y="3416952"/>
+            <a:ext cx="1052583" cy="2664884"/>
           </a:xfrm>
           <a:prstGeom prst="bentConnector3">
             <a:avLst>
@@ -6832,7 +6646,7 @@
                   <a:latin typeface="Arial" panose="020B0604020202020204" pitchFamily="34" charset="0"/>
                   <a:cs typeface="Arial" panose="020B0604020202020204" pitchFamily="34" charset="0"/>
                 </a:rPr>
-                <a:t>Future needs</a:t>
+                <a:t>Additional needs</a:t>
               </a:r>
               <a:endParaRPr lang="en-US" sz="1200" dirty="0"/>
             </a:p>
@@ -6995,7 +6809,7 @@
                   <a:latin typeface="Arial" panose="020B0604020202020204" pitchFamily="34" charset="0"/>
                   <a:cs typeface="Arial" panose="020B0604020202020204" pitchFamily="34" charset="0"/>
                 </a:rPr>
-                <a:t>Future needs</a:t>
+                <a:t>Additional needs</a:t>
               </a:r>
               <a:endParaRPr lang="en-US" sz="1200" dirty="0"/>
             </a:p>
@@ -7020,8 +6834,8 @@
         </p:nvCxnSpPr>
         <p:spPr>
           <a:xfrm rot="16200000" flipV="1">
-            <a:off x="3635033" y="4513646"/>
-            <a:ext cx="662620" cy="861458"/>
+            <a:off x="3440052" y="4318665"/>
+            <a:ext cx="1052583" cy="861458"/>
           </a:xfrm>
           <a:prstGeom prst="bentConnector3">
             <a:avLst>
@@ -7068,8 +6882,8 @@
         </p:nvCxnSpPr>
         <p:spPr>
           <a:xfrm rot="5400000" flipH="1" flipV="1">
-            <a:off x="2759517" y="4499589"/>
-            <a:ext cx="662620" cy="889573"/>
+            <a:off x="2564536" y="4304608"/>
+            <a:ext cx="1052583" cy="889573"/>
           </a:xfrm>
           <a:prstGeom prst="bentConnector3">
             <a:avLst>
@@ -7113,9 +6927,9 @@
         <p:grpSpPr>
           <a:xfrm>
             <a:off x="7816338" y="632625"/>
-            <a:ext cx="1371600" cy="2696530"/>
+            <a:ext cx="1371600" cy="2198293"/>
             <a:chOff x="7845289" y="361073"/>
-            <a:chExt cx="1371600" cy="2696530"/>
+            <a:chExt cx="1371600" cy="2198293"/>
           </a:xfrm>
         </p:grpSpPr>
         <p:sp>
@@ -7133,7 +6947,7 @@
           <p:spPr>
             <a:xfrm>
               <a:off x="7845289" y="361073"/>
-              <a:ext cx="1371600" cy="2696530"/>
+              <a:ext cx="1371600" cy="2198293"/>
             </a:xfrm>
             <a:prstGeom prst="rect">
               <a:avLst/>
@@ -7183,7 +6997,7 @@
           </p:nvSpPr>
           <p:spPr>
             <a:xfrm>
-              <a:off x="8233572" y="802469"/>
+              <a:off x="8233572" y="361073"/>
               <a:ext cx="595035" cy="276999"/>
             </a:xfrm>
             <a:prstGeom prst="rect">
@@ -7212,36 +7026,6 @@
             </a:p>
           </p:txBody>
         </p:sp>
-        <p:pic>
-          <p:nvPicPr>
-            <p:cNvPr id="42" name="Picture 41">
-              <a:extLst>
-                <a:ext uri="{FF2B5EF4-FFF2-40B4-BE49-F238E27FC236}">
-                  <a16:creationId xmlns:a16="http://schemas.microsoft.com/office/drawing/2014/main" id="{B4A95163-4626-F14D-91E5-43373CE9264E}"/>
-                </a:ext>
-              </a:extLst>
-            </p:cNvPr>
-            <p:cNvPicPr>
-              <a:picLocks noChangeAspect="1"/>
-            </p:cNvPicPr>
-            <p:nvPr/>
-          </p:nvPicPr>
-          <p:blipFill>
-            <a:blip r:embed="rId7"/>
-            <a:stretch>
-              <a:fillRect/>
-            </a:stretch>
-          </p:blipFill>
-          <p:spPr>
-            <a:xfrm>
-              <a:off x="8327889" y="468841"/>
-              <a:ext cx="406400" cy="406400"/>
-            </a:xfrm>
-            <a:prstGeom prst="rect">
-              <a:avLst/>
-            </a:prstGeom>
-          </p:spPr>
-        </p:pic>
         <p:sp>
           <p:nvSpPr>
             <p:cNvPr id="51" name="Rectangle 50">
@@ -7256,7 +7040,7 @@
           </p:nvSpPr>
           <p:spPr>
             <a:xfrm>
-              <a:off x="7936729" y="1105754"/>
+              <a:off x="7936729" y="674678"/>
               <a:ext cx="1188720" cy="1737823"/>
             </a:xfrm>
             <a:prstGeom prst="rect">
@@ -7307,7 +7091,7 @@
           </p:nvSpPr>
           <p:spPr>
             <a:xfrm>
-              <a:off x="8073889" y="1451269"/>
+              <a:off x="8073889" y="1020193"/>
               <a:ext cx="914400" cy="276999"/>
             </a:xfrm>
             <a:prstGeom prst="rect">
@@ -7354,7 +7138,7 @@
           </p:nvSpPr>
           <p:spPr>
             <a:xfrm>
-              <a:off x="8073889" y="1777924"/>
+              <a:off x="8073889" y="1346848"/>
               <a:ext cx="914400" cy="276999"/>
             </a:xfrm>
             <a:prstGeom prst="rect">
@@ -7401,7 +7185,7 @@
           </p:nvSpPr>
           <p:spPr>
             <a:xfrm>
-              <a:off x="8073889" y="2104579"/>
+              <a:off x="8073889" y="1673503"/>
               <a:ext cx="914400" cy="276999"/>
             </a:xfrm>
             <a:prstGeom prst="rect">
@@ -7448,7 +7232,7 @@
           </p:nvSpPr>
           <p:spPr>
             <a:xfrm>
-              <a:off x="8073889" y="2431233"/>
+              <a:off x="8073889" y="2000157"/>
               <a:ext cx="914400" cy="276999"/>
             </a:xfrm>
             <a:prstGeom prst="rect">
@@ -7495,7 +7279,7 @@
           </p:nvSpPr>
           <p:spPr>
             <a:xfrm>
-              <a:off x="7948715" y="1105754"/>
+              <a:off x="7948715" y="674678"/>
               <a:ext cx="1183496" cy="276999"/>
             </a:xfrm>
             <a:prstGeom prst="rect">
@@ -7526,371 +7310,521 @@
           </p:txBody>
         </p:sp>
       </p:grpSp>
-      <p:grpSp>
-        <p:nvGrpSpPr>
-          <p:cNvPr id="2" name="Group 1">
-            <a:extLst>
-              <a:ext uri="{FF2B5EF4-FFF2-40B4-BE49-F238E27FC236}">
-                <a16:creationId xmlns:a16="http://schemas.microsoft.com/office/drawing/2014/main" id="{76065BD9-84EC-2D41-9B27-494A38730E05}"/>
-              </a:ext>
-            </a:extLst>
-          </p:cNvPr>
-          <p:cNvGrpSpPr/>
+      <p:sp>
+        <p:nvSpPr>
+          <p:cNvPr id="25" name="Rectangle 24">
+            <a:extLst>
+              <a:ext uri="{FF2B5EF4-FFF2-40B4-BE49-F238E27FC236}">
+                <a16:creationId xmlns:a16="http://schemas.microsoft.com/office/drawing/2014/main" id="{44E58876-C7DF-7748-879A-E8CFB7A88C90}"/>
+              </a:ext>
+            </a:extLst>
+          </p:cNvPr>
+          <p:cNvSpPr/>
           <p:nvPr/>
-        </p:nvGrpSpPr>
-        <p:grpSpPr>
+        </p:nvSpPr>
+        <p:spPr>
           <a:xfrm>
             <a:off x="6030826" y="632625"/>
-            <a:ext cx="1371600" cy="2354666"/>
-            <a:chOff x="6030826" y="632625"/>
-            <a:chExt cx="1371600" cy="2354666"/>
+            <a:ext cx="1371600" cy="3387567"/>
           </a:xfrm>
-        </p:grpSpPr>
-        <p:sp>
-          <p:nvSpPr>
-            <p:cNvPr id="25" name="Rectangle 24">
-              <a:extLst>
-                <a:ext uri="{FF2B5EF4-FFF2-40B4-BE49-F238E27FC236}">
-                  <a16:creationId xmlns:a16="http://schemas.microsoft.com/office/drawing/2014/main" id="{44E58876-C7DF-7748-879A-E8CFB7A88C90}"/>
-                </a:ext>
-              </a:extLst>
-            </p:cNvPr>
-            <p:cNvSpPr/>
-            <p:nvPr/>
-          </p:nvSpPr>
-          <p:spPr>
-            <a:xfrm>
-              <a:off x="6030826" y="632625"/>
-              <a:ext cx="1371600" cy="2354666"/>
-            </a:xfrm>
-            <a:prstGeom prst="rect">
-              <a:avLst/>
-            </a:prstGeom>
+          <a:prstGeom prst="rect">
+            <a:avLst/>
+          </a:prstGeom>
+          <a:solidFill>
+            <a:schemeClr val="bg1">
+              <a:lumMod val="85000"/>
+            </a:schemeClr>
+          </a:solidFill>
+        </p:spPr>
+        <p:style>
+          <a:lnRef idx="2">
+            <a:schemeClr val="accent1">
+              <a:shade val="50000"/>
+            </a:schemeClr>
+          </a:lnRef>
+          <a:fillRef idx="1">
+            <a:schemeClr val="accent1"/>
+          </a:fillRef>
+          <a:effectRef idx="0">
+            <a:schemeClr val="accent1"/>
+          </a:effectRef>
+          <a:fontRef idx="minor">
+            <a:schemeClr val="lt1"/>
+          </a:fontRef>
+        </p:style>
+        <p:txBody>
+          <a:bodyPr rtlCol="0" anchor="ctr"/>
+          <a:lstStyle/>
+          <a:p>
+            <a:pPr algn="ctr"/>
+            <a:endParaRPr lang="en-US" dirty="0"/>
+          </a:p>
+        </p:txBody>
+      </p:sp>
+      <p:sp>
+        <p:nvSpPr>
+          <p:cNvPr id="27" name="TextBox 26">
+            <a:extLst>
+              <a:ext uri="{FF2B5EF4-FFF2-40B4-BE49-F238E27FC236}">
+                <a16:creationId xmlns:a16="http://schemas.microsoft.com/office/drawing/2014/main" id="{C216CB91-04EF-114E-848E-934101196852}"/>
+              </a:ext>
+            </a:extLst>
+          </p:cNvPr>
+          <p:cNvSpPr txBox="1"/>
+          <p:nvPr/>
+        </p:nvSpPr>
+        <p:spPr>
+          <a:xfrm>
+            <a:off x="6034495" y="632625"/>
+            <a:ext cx="1364262" cy="276999"/>
+          </a:xfrm>
+          <a:prstGeom prst="rect">
+            <a:avLst/>
+          </a:prstGeom>
+          <a:noFill/>
+        </p:spPr>
+        <p:txBody>
+          <a:bodyPr wrap="square" rtlCol="0">
+            <a:spAutoFit/>
+          </a:bodyPr>
+          <a:lstStyle/>
+          <a:p>
+            <a:pPr algn="ctr"/>
+            <a:r>
+              <a:rPr lang="en-US" sz="1200" dirty="0">
+                <a:solidFill>
+                  <a:schemeClr val="bg1">
+                    <a:lumMod val="50000"/>
+                  </a:schemeClr>
+                </a:solidFill>
+                <a:latin typeface="Arial" panose="020B0604020202020204" pitchFamily="34" charset="0"/>
+                <a:cs typeface="Arial" panose="020B0604020202020204" pitchFamily="34" charset="0"/>
+              </a:rPr>
+              <a:t>Participant App</a:t>
+            </a:r>
+          </a:p>
+        </p:txBody>
+      </p:sp>
+      <p:sp>
+        <p:nvSpPr>
+          <p:cNvPr id="37" name="Rectangle 36">
+            <a:extLst>
+              <a:ext uri="{FF2B5EF4-FFF2-40B4-BE49-F238E27FC236}">
+                <a16:creationId xmlns:a16="http://schemas.microsoft.com/office/drawing/2014/main" id="{67B582C5-2EAB-CF42-9381-F336FD45D0BE}"/>
+              </a:ext>
+            </a:extLst>
+          </p:cNvPr>
+          <p:cNvSpPr/>
+          <p:nvPr/>
+        </p:nvSpPr>
+        <p:spPr>
+          <a:xfrm>
+            <a:off x="6155928" y="1321767"/>
+            <a:ext cx="1121397" cy="276999"/>
+          </a:xfrm>
+          <a:prstGeom prst="rect">
+            <a:avLst/>
+          </a:prstGeom>
+          <a:solidFill>
+            <a:schemeClr val="bg1"/>
+          </a:solidFill>
+          <a:ln w="38100">
             <a:solidFill>
-              <a:schemeClr val="bg1">
-                <a:lumMod val="85000"/>
-              </a:schemeClr>
+              <a:srgbClr val="FFC000"/>
             </a:solidFill>
-          </p:spPr>
-          <p:style>
-            <a:lnRef idx="2">
-              <a:schemeClr val="accent1">
-                <a:shade val="50000"/>
-              </a:schemeClr>
-            </a:lnRef>
-            <a:fillRef idx="1">
-              <a:schemeClr val="accent1"/>
-            </a:fillRef>
-            <a:effectRef idx="0">
-              <a:schemeClr val="accent1"/>
-            </a:effectRef>
-            <a:fontRef idx="minor">
-              <a:schemeClr val="lt1"/>
-            </a:fontRef>
-          </p:style>
-          <p:txBody>
-            <a:bodyPr rtlCol="0" anchor="ctr"/>
-            <a:lstStyle/>
-            <a:p>
-              <a:pPr algn="ctr"/>
-              <a:endParaRPr lang="en-US" dirty="0"/>
-            </a:p>
-          </p:txBody>
-        </p:sp>
-        <p:sp>
-          <p:nvSpPr>
-            <p:cNvPr id="27" name="TextBox 26">
-              <a:extLst>
-                <a:ext uri="{FF2B5EF4-FFF2-40B4-BE49-F238E27FC236}">
-                  <a16:creationId xmlns:a16="http://schemas.microsoft.com/office/drawing/2014/main" id="{C216CB91-04EF-114E-848E-934101196852}"/>
-                </a:ext>
-              </a:extLst>
-            </p:cNvPr>
-            <p:cNvSpPr txBox="1"/>
-            <p:nvPr/>
-          </p:nvSpPr>
-          <p:spPr>
-            <a:xfrm>
-              <a:off x="6034495" y="1074020"/>
-              <a:ext cx="1364262" cy="276999"/>
-            </a:xfrm>
-            <a:prstGeom prst="rect">
-              <a:avLst/>
-            </a:prstGeom>
-            <a:noFill/>
-          </p:spPr>
-          <p:txBody>
-            <a:bodyPr wrap="square" rtlCol="0">
-              <a:spAutoFit/>
-            </a:bodyPr>
-            <a:lstStyle/>
-            <a:p>
-              <a:r>
-                <a:rPr lang="en-US" sz="1200" dirty="0">
-                  <a:solidFill>
-                    <a:schemeClr val="bg1">
-                      <a:lumMod val="50000"/>
-                    </a:schemeClr>
-                  </a:solidFill>
-                  <a:latin typeface="Arial" panose="020B0604020202020204" pitchFamily="34" charset="0"/>
-                  <a:cs typeface="Arial" panose="020B0604020202020204" pitchFamily="34" charset="0"/>
-                </a:rPr>
-                <a:t>Participant App</a:t>
-              </a:r>
-            </a:p>
-          </p:txBody>
-        </p:sp>
-        <p:pic>
-          <p:nvPicPr>
-            <p:cNvPr id="31" name="Picture 30">
-              <a:extLst>
-                <a:ext uri="{FF2B5EF4-FFF2-40B4-BE49-F238E27FC236}">
-                  <a16:creationId xmlns:a16="http://schemas.microsoft.com/office/drawing/2014/main" id="{B8F4B1C4-FBE6-1342-934E-760DF2524E03}"/>
-                </a:ext>
-              </a:extLst>
-            </p:cNvPr>
-            <p:cNvPicPr>
-              <a:picLocks noChangeAspect="1"/>
-            </p:cNvPicPr>
-            <p:nvPr/>
-          </p:nvPicPr>
-          <p:blipFill>
-            <a:blip r:embed="rId7"/>
-            <a:stretch>
-              <a:fillRect/>
-            </a:stretch>
-          </p:blipFill>
-          <p:spPr>
-            <a:xfrm>
-              <a:off x="6513426" y="740392"/>
-              <a:ext cx="406400" cy="406400"/>
-            </a:xfrm>
-            <a:prstGeom prst="rect">
-              <a:avLst/>
-            </a:prstGeom>
-          </p:spPr>
-        </p:pic>
-        <p:sp>
-          <p:nvSpPr>
-            <p:cNvPr id="37" name="Rectangle 36">
-              <a:extLst>
-                <a:ext uri="{FF2B5EF4-FFF2-40B4-BE49-F238E27FC236}">
-                  <a16:creationId xmlns:a16="http://schemas.microsoft.com/office/drawing/2014/main" id="{67B582C5-2EAB-CF42-9381-F336FD45D0BE}"/>
-                </a:ext>
-              </a:extLst>
-            </p:cNvPr>
-            <p:cNvSpPr/>
-            <p:nvPr/>
-          </p:nvSpPr>
-          <p:spPr>
-            <a:xfrm>
-              <a:off x="6155928" y="1400388"/>
-              <a:ext cx="1121397" cy="276999"/>
-            </a:xfrm>
-            <a:prstGeom prst="rect">
-              <a:avLst/>
-            </a:prstGeom>
+          </a:ln>
+        </p:spPr>
+        <p:txBody>
+          <a:bodyPr wrap="square">
+            <a:spAutoFit/>
+          </a:bodyPr>
+          <a:lstStyle/>
+          <a:p>
+            <a:pPr algn="ctr"/>
+            <a:r>
+              <a:rPr lang="en-US" sz="1200" dirty="0">
+                <a:latin typeface="Arial" panose="020B0604020202020204" pitchFamily="34" charset="0"/>
+                <a:cs typeface="Arial" panose="020B0604020202020204" pitchFamily="34" charset="0"/>
+              </a:rPr>
+              <a:t>Registration</a:t>
+            </a:r>
+            <a:endParaRPr lang="en-US" sz="1200" dirty="0"/>
+          </a:p>
+        </p:txBody>
+      </p:sp>
+      <p:sp>
+        <p:nvSpPr>
+          <p:cNvPr id="38" name="Rectangle 37">
+            <a:extLst>
+              <a:ext uri="{FF2B5EF4-FFF2-40B4-BE49-F238E27FC236}">
+                <a16:creationId xmlns:a16="http://schemas.microsoft.com/office/drawing/2014/main" id="{45247ED2-1D51-DC4B-9B0D-CB3ACF7E3999}"/>
+              </a:ext>
+            </a:extLst>
+          </p:cNvPr>
+          <p:cNvSpPr/>
+          <p:nvPr/>
+        </p:nvSpPr>
+        <p:spPr>
+          <a:xfrm>
+            <a:off x="6155928" y="2009201"/>
+            <a:ext cx="1121397" cy="461665"/>
+          </a:xfrm>
+          <a:prstGeom prst="rect">
+            <a:avLst/>
+          </a:prstGeom>
+          <a:solidFill>
+            <a:schemeClr val="bg1"/>
+          </a:solidFill>
+          <a:ln w="38100">
             <a:solidFill>
-              <a:schemeClr val="bg1"/>
+              <a:srgbClr val="FFC000"/>
             </a:solidFill>
-            <a:ln w="38100">
-              <a:solidFill>
-                <a:srgbClr val="FFC000"/>
-              </a:solidFill>
-            </a:ln>
-          </p:spPr>
-          <p:txBody>
-            <a:bodyPr wrap="square">
-              <a:spAutoFit/>
-            </a:bodyPr>
-            <a:lstStyle/>
-            <a:p>
-              <a:pPr algn="ctr"/>
-              <a:r>
-                <a:rPr lang="en-US" sz="1200" dirty="0">
-                  <a:latin typeface="Arial" panose="020B0604020202020204" pitchFamily="34" charset="0"/>
-                  <a:cs typeface="Arial" panose="020B0604020202020204" pitchFamily="34" charset="0"/>
-                </a:rPr>
-                <a:t>Registration</a:t>
-              </a:r>
-              <a:endParaRPr lang="en-US" sz="1200" dirty="0"/>
-            </a:p>
-          </p:txBody>
-        </p:sp>
-        <p:sp>
-          <p:nvSpPr>
-            <p:cNvPr id="38" name="Rectangle 37">
-              <a:extLst>
-                <a:ext uri="{FF2B5EF4-FFF2-40B4-BE49-F238E27FC236}">
-                  <a16:creationId xmlns:a16="http://schemas.microsoft.com/office/drawing/2014/main" id="{45247ED2-1D51-DC4B-9B0D-CB3ACF7E3999}"/>
-                </a:ext>
-              </a:extLst>
-            </p:cNvPr>
-            <p:cNvSpPr/>
-            <p:nvPr/>
-          </p:nvSpPr>
-          <p:spPr>
-            <a:xfrm>
-              <a:off x="6155928" y="2484689"/>
-              <a:ext cx="1121397" cy="461665"/>
-            </a:xfrm>
-            <a:prstGeom prst="rect">
-              <a:avLst/>
-            </a:prstGeom>
+          </a:ln>
+        </p:spPr>
+        <p:txBody>
+          <a:bodyPr wrap="square">
+            <a:spAutoFit/>
+          </a:bodyPr>
+          <a:lstStyle/>
+          <a:p>
+            <a:pPr algn="ctr"/>
+            <a:r>
+              <a:rPr lang="en-US" sz="1200" dirty="0">
+                <a:latin typeface="Arial" panose="020B0604020202020204" pitchFamily="34" charset="0"/>
+                <a:cs typeface="Arial" panose="020B0604020202020204" pitchFamily="34" charset="0"/>
+              </a:rPr>
+              <a:t>Participant Dashboard</a:t>
+            </a:r>
+            <a:endParaRPr lang="en-US" sz="1200" dirty="0"/>
+          </a:p>
+        </p:txBody>
+      </p:sp>
+      <p:sp>
+        <p:nvSpPr>
+          <p:cNvPr id="69" name="Rectangle 68">
+            <a:extLst>
+              <a:ext uri="{FF2B5EF4-FFF2-40B4-BE49-F238E27FC236}">
+                <a16:creationId xmlns:a16="http://schemas.microsoft.com/office/drawing/2014/main" id="{CBD3FB4A-0EBF-214A-974A-FA44047D18FF}"/>
+              </a:ext>
+            </a:extLst>
+          </p:cNvPr>
+          <p:cNvSpPr/>
+          <p:nvPr/>
+        </p:nvSpPr>
+        <p:spPr>
+          <a:xfrm>
+            <a:off x="6155928" y="2881301"/>
+            <a:ext cx="1121397" cy="276999"/>
+          </a:xfrm>
+          <a:prstGeom prst="rect">
+            <a:avLst/>
+          </a:prstGeom>
+          <a:solidFill>
+            <a:schemeClr val="bg1"/>
+          </a:solidFill>
+          <a:ln w="38100">
             <a:solidFill>
-              <a:schemeClr val="bg1"/>
+              <a:srgbClr val="FFFF00"/>
             </a:solidFill>
-            <a:ln w="38100">
-              <a:solidFill>
-                <a:srgbClr val="FFC000"/>
-              </a:solidFill>
-            </a:ln>
-          </p:spPr>
-          <p:txBody>
-            <a:bodyPr wrap="square">
-              <a:spAutoFit/>
-            </a:bodyPr>
-            <a:lstStyle/>
-            <a:p>
-              <a:pPr algn="ctr"/>
-              <a:r>
-                <a:rPr lang="en-US" sz="1200" dirty="0">
-                  <a:latin typeface="Arial" panose="020B0604020202020204" pitchFamily="34" charset="0"/>
-                  <a:cs typeface="Arial" panose="020B0604020202020204" pitchFamily="34" charset="0"/>
-                </a:rPr>
-                <a:t>Participant Dashboard</a:t>
-              </a:r>
-              <a:endParaRPr lang="en-US" sz="1200" dirty="0"/>
-            </a:p>
-          </p:txBody>
-        </p:sp>
-        <p:sp>
-          <p:nvSpPr>
-            <p:cNvPr id="69" name="Rectangle 68">
-              <a:extLst>
-                <a:ext uri="{FF2B5EF4-FFF2-40B4-BE49-F238E27FC236}">
-                  <a16:creationId xmlns:a16="http://schemas.microsoft.com/office/drawing/2014/main" id="{CBD3FB4A-0EBF-214A-974A-FA44047D18FF}"/>
-                </a:ext>
-              </a:extLst>
-            </p:cNvPr>
-            <p:cNvSpPr/>
-            <p:nvPr/>
-          </p:nvSpPr>
-          <p:spPr>
-            <a:xfrm>
-              <a:off x="6155928" y="2123256"/>
-              <a:ext cx="1121397" cy="276999"/>
-            </a:xfrm>
-            <a:prstGeom prst="rect">
-              <a:avLst/>
-            </a:prstGeom>
+          </a:ln>
+        </p:spPr>
+        <p:txBody>
+          <a:bodyPr wrap="square">
+            <a:spAutoFit/>
+          </a:bodyPr>
+          <a:lstStyle/>
+          <a:p>
+            <a:pPr algn="ctr"/>
+            <a:r>
+              <a:rPr lang="en-US" sz="1200" dirty="0">
+                <a:latin typeface="Arial" panose="020B0604020202020204" pitchFamily="34" charset="0"/>
+                <a:cs typeface="Arial" panose="020B0604020202020204" pitchFamily="34" charset="0"/>
+              </a:rPr>
+              <a:t>Consent</a:t>
+            </a:r>
+            <a:endParaRPr lang="en-US" sz="1200" dirty="0"/>
+          </a:p>
+        </p:txBody>
+      </p:sp>
+      <p:sp>
+        <p:nvSpPr>
+          <p:cNvPr id="109" name="Rectangle 108">
+            <a:extLst>
+              <a:ext uri="{FF2B5EF4-FFF2-40B4-BE49-F238E27FC236}">
+                <a16:creationId xmlns:a16="http://schemas.microsoft.com/office/drawing/2014/main" id="{4B9CC4C0-EA90-D246-8F11-B1F7F9699B2F}"/>
+              </a:ext>
+            </a:extLst>
+          </p:cNvPr>
+          <p:cNvSpPr/>
+          <p:nvPr/>
+        </p:nvSpPr>
+        <p:spPr>
+          <a:xfrm>
+            <a:off x="6155928" y="978050"/>
+            <a:ext cx="1121397" cy="276999"/>
+          </a:xfrm>
+          <a:prstGeom prst="rect">
+            <a:avLst/>
+          </a:prstGeom>
+          <a:solidFill>
+            <a:schemeClr val="bg1"/>
+          </a:solidFill>
+          <a:ln w="38100">
             <a:solidFill>
-              <a:schemeClr val="bg1"/>
+              <a:srgbClr val="FFFF00"/>
             </a:solidFill>
-            <a:ln w="38100">
-              <a:solidFill>
-                <a:srgbClr val="FFFF00"/>
-              </a:solidFill>
-            </a:ln>
-          </p:spPr>
-          <p:txBody>
-            <a:bodyPr wrap="square">
-              <a:spAutoFit/>
-            </a:bodyPr>
-            <a:lstStyle/>
-            <a:p>
-              <a:pPr algn="ctr"/>
-              <a:r>
-                <a:rPr lang="en-US" sz="1200" dirty="0">
-                  <a:latin typeface="Arial" panose="020B0604020202020204" pitchFamily="34" charset="0"/>
-                  <a:cs typeface="Arial" panose="020B0604020202020204" pitchFamily="34" charset="0"/>
-                </a:rPr>
-                <a:t>Consent</a:t>
-              </a:r>
-              <a:endParaRPr lang="en-US" sz="1200" dirty="0"/>
-            </a:p>
-          </p:txBody>
-        </p:sp>
-        <p:sp>
-          <p:nvSpPr>
-            <p:cNvPr id="5" name="TextBox 4">
-              <a:extLst>
-                <a:ext uri="{FF2B5EF4-FFF2-40B4-BE49-F238E27FC236}">
-                  <a16:creationId xmlns:a16="http://schemas.microsoft.com/office/drawing/2014/main" id="{09B58560-F43E-444A-8D5E-BE811EC0C424}"/>
-                </a:ext>
-              </a:extLst>
-            </p:cNvPr>
-            <p:cNvSpPr txBox="1"/>
-            <p:nvPr/>
-          </p:nvSpPr>
-          <p:spPr>
-            <a:xfrm>
-              <a:off x="6624261" y="2380524"/>
-              <a:ext cx="184731" cy="369332"/>
-            </a:xfrm>
-            <a:prstGeom prst="rect">
-              <a:avLst/>
-            </a:prstGeom>
-            <a:noFill/>
-          </p:spPr>
-          <p:txBody>
-            <a:bodyPr wrap="none" rtlCol="0">
-              <a:spAutoFit/>
-            </a:bodyPr>
-            <a:lstStyle/>
-            <a:p>
-              <a:endParaRPr lang="en-US" dirty="0"/>
-            </a:p>
-          </p:txBody>
-        </p:sp>
-        <p:sp>
-          <p:nvSpPr>
-            <p:cNvPr id="109" name="Rectangle 108">
-              <a:extLst>
-                <a:ext uri="{FF2B5EF4-FFF2-40B4-BE49-F238E27FC236}">
-                  <a16:creationId xmlns:a16="http://schemas.microsoft.com/office/drawing/2014/main" id="{4B9CC4C0-EA90-D246-8F11-B1F7F9699B2F}"/>
-                </a:ext>
-              </a:extLst>
-            </p:cNvPr>
-            <p:cNvSpPr/>
-            <p:nvPr/>
-          </p:nvSpPr>
-          <p:spPr>
-            <a:xfrm>
-              <a:off x="6155928" y="1761822"/>
-              <a:ext cx="1121397" cy="276999"/>
-            </a:xfrm>
-            <a:prstGeom prst="rect">
-              <a:avLst/>
-            </a:prstGeom>
+          </a:ln>
+        </p:spPr>
+        <p:txBody>
+          <a:bodyPr wrap="square">
+            <a:spAutoFit/>
+          </a:bodyPr>
+          <a:lstStyle/>
+          <a:p>
+            <a:pPr algn="ctr"/>
+            <a:r>
+              <a:rPr lang="en-US" sz="1200" dirty="0">
+                <a:latin typeface="Arial" panose="020B0604020202020204" pitchFamily="34" charset="0"/>
+                <a:cs typeface="Arial" panose="020B0604020202020204" pitchFamily="34" charset="0"/>
+              </a:rPr>
+              <a:t>Sign in</a:t>
+            </a:r>
+            <a:endParaRPr lang="en-US" sz="1200" dirty="0"/>
+          </a:p>
+        </p:txBody>
+      </p:sp>
+      <p:sp>
+        <p:nvSpPr>
+          <p:cNvPr id="112" name="Rectangle 111">
+            <a:extLst>
+              <a:ext uri="{FF2B5EF4-FFF2-40B4-BE49-F238E27FC236}">
+                <a16:creationId xmlns:a16="http://schemas.microsoft.com/office/drawing/2014/main" id="{1A4EFEC3-770E-144D-8688-4E51D4EDA395}"/>
+              </a:ext>
+            </a:extLst>
+          </p:cNvPr>
+          <p:cNvSpPr/>
+          <p:nvPr/>
+        </p:nvSpPr>
+        <p:spPr>
+          <a:xfrm>
+            <a:off x="6155928" y="2537584"/>
+            <a:ext cx="1121397" cy="276999"/>
+          </a:xfrm>
+          <a:prstGeom prst="rect">
+            <a:avLst/>
+          </a:prstGeom>
+          <a:solidFill>
+            <a:schemeClr val="bg1"/>
+          </a:solidFill>
+          <a:ln w="38100">
             <a:solidFill>
-              <a:schemeClr val="bg1"/>
+              <a:srgbClr val="FFC000"/>
             </a:solidFill>
-            <a:ln w="38100">
-              <a:solidFill>
-                <a:srgbClr val="FFFF00"/>
-              </a:solidFill>
-            </a:ln>
-          </p:spPr>
-          <p:txBody>
-            <a:bodyPr wrap="square">
-              <a:spAutoFit/>
-            </a:bodyPr>
-            <a:lstStyle/>
-            <a:p>
-              <a:pPr algn="ctr"/>
-              <a:r>
-                <a:rPr lang="en-US" sz="1200" dirty="0">
-                  <a:latin typeface="Arial" panose="020B0604020202020204" pitchFamily="34" charset="0"/>
-                  <a:cs typeface="Arial" panose="020B0604020202020204" pitchFamily="34" charset="0"/>
-                </a:rPr>
-                <a:t>Sign in</a:t>
-              </a:r>
-              <a:endParaRPr lang="en-US" sz="1200" dirty="0"/>
-            </a:p>
-          </p:txBody>
-        </p:sp>
-      </p:grpSp>
+          </a:ln>
+        </p:spPr>
+        <p:txBody>
+          <a:bodyPr wrap="square">
+            <a:spAutoFit/>
+          </a:bodyPr>
+          <a:lstStyle/>
+          <a:p>
+            <a:pPr algn="ctr"/>
+            <a:r>
+              <a:rPr lang="en-US" sz="1200" dirty="0">
+                <a:latin typeface="Arial" panose="020B0604020202020204" pitchFamily="34" charset="0"/>
+                <a:cs typeface="Arial" panose="020B0604020202020204" pitchFamily="34" charset="0"/>
+              </a:rPr>
+              <a:t>My Data</a:t>
+            </a:r>
+            <a:endParaRPr lang="en-US" sz="1200" dirty="0"/>
+          </a:p>
+        </p:txBody>
+      </p:sp>
+      <p:sp>
+        <p:nvSpPr>
+          <p:cNvPr id="126" name="Rectangle 125">
+            <a:extLst>
+              <a:ext uri="{FF2B5EF4-FFF2-40B4-BE49-F238E27FC236}">
+                <a16:creationId xmlns:a16="http://schemas.microsoft.com/office/drawing/2014/main" id="{EDE889A5-4F27-3D45-8954-2D194BFF0844}"/>
+              </a:ext>
+            </a:extLst>
+          </p:cNvPr>
+          <p:cNvSpPr/>
+          <p:nvPr/>
+        </p:nvSpPr>
+        <p:spPr>
+          <a:xfrm>
+            <a:off x="6155928" y="1665484"/>
+            <a:ext cx="1121397" cy="276999"/>
+          </a:xfrm>
+          <a:prstGeom prst="rect">
+            <a:avLst/>
+          </a:prstGeom>
+          <a:solidFill>
+            <a:schemeClr val="bg1"/>
+          </a:solidFill>
+          <a:ln w="38100">
+            <a:solidFill>
+              <a:srgbClr val="FFC000"/>
+            </a:solidFill>
+          </a:ln>
+        </p:spPr>
+        <p:txBody>
+          <a:bodyPr wrap="square">
+            <a:spAutoFit/>
+          </a:bodyPr>
+          <a:lstStyle/>
+          <a:p>
+            <a:pPr algn="ctr"/>
+            <a:r>
+              <a:rPr lang="en-US" sz="1200" dirty="0">
+                <a:latin typeface="Arial" panose="020B0604020202020204" pitchFamily="34" charset="0"/>
+                <a:cs typeface="Arial" panose="020B0604020202020204" pitchFamily="34" charset="0"/>
+              </a:rPr>
+              <a:t>User profile</a:t>
+            </a:r>
+            <a:endParaRPr lang="en-US" sz="1200" dirty="0"/>
+          </a:p>
+        </p:txBody>
+      </p:sp>
+      <p:sp>
+        <p:nvSpPr>
+          <p:cNvPr id="129" name="Rectangle 128">
+            <a:extLst>
+              <a:ext uri="{FF2B5EF4-FFF2-40B4-BE49-F238E27FC236}">
+                <a16:creationId xmlns:a16="http://schemas.microsoft.com/office/drawing/2014/main" id="{88C8A10A-67EA-D54C-A29F-FE36C7A32234}"/>
+              </a:ext>
+            </a:extLst>
+          </p:cNvPr>
+          <p:cNvSpPr/>
+          <p:nvPr/>
+        </p:nvSpPr>
+        <p:spPr>
+          <a:xfrm>
+            <a:off x="6155928" y="3225018"/>
+            <a:ext cx="1121397" cy="276999"/>
+          </a:xfrm>
+          <a:prstGeom prst="rect">
+            <a:avLst/>
+          </a:prstGeom>
+          <a:solidFill>
+            <a:schemeClr val="bg1"/>
+          </a:solidFill>
+          <a:ln w="38100">
+            <a:solidFill>
+              <a:srgbClr val="FFC000"/>
+            </a:solidFill>
+          </a:ln>
+        </p:spPr>
+        <p:txBody>
+          <a:bodyPr wrap="square">
+            <a:spAutoFit/>
+          </a:bodyPr>
+          <a:lstStyle/>
+          <a:p>
+            <a:pPr algn="ctr"/>
+            <a:r>
+              <a:rPr lang="en-US" sz="1200" dirty="0">
+                <a:latin typeface="Arial" panose="020B0604020202020204" pitchFamily="34" charset="0"/>
+                <a:cs typeface="Arial" panose="020B0604020202020204" pitchFamily="34" charset="0"/>
+              </a:rPr>
+              <a:t>Settings</a:t>
+            </a:r>
+            <a:endParaRPr lang="en-US" sz="1200" dirty="0"/>
+          </a:p>
+        </p:txBody>
+      </p:sp>
+      <p:sp>
+        <p:nvSpPr>
+          <p:cNvPr id="130" name="Rectangle 129">
+            <a:extLst>
+              <a:ext uri="{FF2B5EF4-FFF2-40B4-BE49-F238E27FC236}">
+                <a16:creationId xmlns:a16="http://schemas.microsoft.com/office/drawing/2014/main" id="{283517C2-4C0D-0344-B15F-69BD9678BA13}"/>
+              </a:ext>
+            </a:extLst>
+          </p:cNvPr>
+          <p:cNvSpPr/>
+          <p:nvPr/>
+        </p:nvSpPr>
+        <p:spPr>
+          <a:xfrm>
+            <a:off x="6155928" y="3568732"/>
+            <a:ext cx="1121397" cy="276999"/>
+          </a:xfrm>
+          <a:prstGeom prst="rect">
+            <a:avLst/>
+          </a:prstGeom>
+          <a:solidFill>
+            <a:schemeClr val="bg1"/>
+          </a:solidFill>
+          <a:ln w="38100">
+            <a:solidFill>
+              <a:srgbClr val="FFC000"/>
+            </a:solidFill>
+          </a:ln>
+        </p:spPr>
+        <p:txBody>
+          <a:bodyPr wrap="square">
+            <a:spAutoFit/>
+          </a:bodyPr>
+          <a:lstStyle/>
+          <a:p>
+            <a:pPr algn="ctr"/>
+            <a:r>
+              <a:rPr lang="en-US" sz="1200" dirty="0">
+                <a:latin typeface="Arial" panose="020B0604020202020204" pitchFamily="34" charset="0"/>
+                <a:cs typeface="Arial" panose="020B0604020202020204" pitchFamily="34" charset="0"/>
+              </a:rPr>
+              <a:t>Support</a:t>
+            </a:r>
+            <a:endParaRPr lang="en-US" sz="1200" dirty="0"/>
+          </a:p>
+        </p:txBody>
+      </p:sp>
+      <p:cxnSp>
+        <p:nvCxnSpPr>
+          <p:cNvPr id="151" name="Straight Arrow Connector 150">
+            <a:extLst>
+              <a:ext uri="{FF2B5EF4-FFF2-40B4-BE49-F238E27FC236}">
+                <a16:creationId xmlns:a16="http://schemas.microsoft.com/office/drawing/2014/main" id="{FC49E993-0021-904C-8C4E-10BD350C2616}"/>
+              </a:ext>
+            </a:extLst>
+          </p:cNvPr>
+          <p:cNvCxnSpPr>
+            <a:cxnSpLocks/>
+          </p:cNvCxnSpPr>
+          <p:nvPr/>
+        </p:nvCxnSpPr>
+        <p:spPr>
+          <a:xfrm flipH="1" flipV="1">
+            <a:off x="1896409" y="1466006"/>
+            <a:ext cx="761200" cy="3452"/>
+          </a:xfrm>
+          <a:prstGeom prst="straightConnector1">
+            <a:avLst/>
+          </a:prstGeom>
+          <a:ln w="38100">
+            <a:solidFill>
+              <a:srgbClr val="FFC000"/>
+            </a:solidFill>
+            <a:tailEnd type="triangle"/>
+          </a:ln>
+        </p:spPr>
+        <p:style>
+          <a:lnRef idx="1">
+            <a:schemeClr val="accent1"/>
+          </a:lnRef>
+          <a:fillRef idx="0">
+            <a:schemeClr val="accent1"/>
+          </a:fillRef>
+          <a:effectRef idx="0">
+            <a:schemeClr val="accent1"/>
+          </a:effectRef>
+          <a:fontRef idx="minor">
+            <a:schemeClr val="tx1"/>
+          </a:fontRef>
+        </p:style>
+      </p:cxnSp>
     </p:spTree>
     <p:extLst>
       <p:ext uri="{BB962C8B-B14F-4D97-AF65-F5344CB8AC3E}">

</xml_diff>